<commit_message>
Fake Firebase added (Does no mentionable work, still works)
</commit_message>
<xml_diff>
--- a/Project Idea Presentation/Productive-Browsing.pptx
+++ b/Project Idea Presentation/Productive-Browsing.pptx
@@ -248,7 +248,7 @@
           <a:p>
             <a:fld id="{BEA74EB7-856E-45FD-83F0-5F7C6F3E4372}" type="datetimeFigureOut">
               <a:rPr lang="en-US"/>
-              <a:t>10/9/2017</a:t>
+              <a:t>11/8/2017</a:t>
             </a:fld>
             <a:endParaRPr dirty="0"/>
           </a:p>
@@ -413,7 +413,7 @@
           <a:p>
             <a:fld id="{C61B0E40-8125-41F8-BB6C-139D8D531A4F}" type="datetimeFigureOut">
               <a:rPr lang="en-US"/>
-              <a:t>10/9/2017</a:t>
+              <a:t>11/8/2017</a:t>
             </a:fld>
             <a:endParaRPr dirty="0"/>
           </a:p>
@@ -1139,7 +1139,7 @@
           <a:p>
             <a:fld id="{333B76B7-5811-4114-8A95-998148FFD529}" type="datetime1">
               <a:rPr lang="en-US" smtClean="0"/>
-              <a:t>10/9/2017</a:t>
+              <a:t>11/8/2017</a:t>
             </a:fld>
             <a:endParaRPr lang="en-US" dirty="0"/>
           </a:p>
@@ -1418,7 +1418,7 @@
           <a:p>
             <a:fld id="{175C077A-EF7A-41AA-8976-110EB7416C60}" type="datetime1">
               <a:rPr lang="en-US" smtClean="0"/>
-              <a:t>10/9/2017</a:t>
+              <a:t>11/8/2017</a:t>
             </a:fld>
             <a:endParaRPr lang="en-US" dirty="0"/>
           </a:p>
@@ -1617,7 +1617,7 @@
           <a:p>
             <a:fld id="{CFF5912B-6681-4BDF-AE10-F59636249FF3}" type="datetime1">
               <a:rPr lang="en-US" smtClean="0"/>
-              <a:t>10/9/2017</a:t>
+              <a:t>11/8/2017</a:t>
             </a:fld>
             <a:endParaRPr lang="en-US" dirty="0"/>
           </a:p>
@@ -1826,7 +1826,7 @@
           <a:p>
             <a:fld id="{905C8E22-D0BA-4CB4-9C32-B27533199514}" type="datetime1">
               <a:rPr lang="en-US" smtClean="0"/>
-              <a:t>10/9/2017</a:t>
+              <a:t>11/8/2017</a:t>
             </a:fld>
             <a:endParaRPr dirty="0"/>
           </a:p>
@@ -2015,7 +2015,7 @@
           <a:p>
             <a:fld id="{FC2180A9-7A83-412D-A8AC-5AF60A8AA507}" type="datetime1">
               <a:rPr lang="en-US" smtClean="0"/>
-              <a:t>10/9/2017</a:t>
+              <a:t>11/8/2017</a:t>
             </a:fld>
             <a:endParaRPr lang="en-US" dirty="0"/>
           </a:p>
@@ -2212,7 +2212,7 @@
           <a:p>
             <a:fld id="{6A563DF0-FDDF-4143-9D8C-6AF41892E174}" type="datetime1">
               <a:rPr lang="en-US" smtClean="0"/>
-              <a:t>10/9/2017</a:t>
+              <a:t>11/8/2017</a:t>
             </a:fld>
             <a:endParaRPr lang="en-US" dirty="0"/>
           </a:p>
@@ -2492,7 +2492,7 @@
           <a:p>
             <a:fld id="{38BB83F9-4677-4C31-8407-7919061A580B}" type="datetime1">
               <a:rPr lang="en-US" smtClean="0"/>
-              <a:t>10/9/2017</a:t>
+              <a:t>11/8/2017</a:t>
             </a:fld>
             <a:endParaRPr lang="en-US" dirty="0"/>
           </a:p>
@@ -2797,7 +2797,7 @@
           <a:p>
             <a:fld id="{C33939A6-3450-434F-A872-BEE63F7EB093}" type="datetime1">
               <a:rPr lang="en-US" smtClean="0"/>
-              <a:t>10/9/2017</a:t>
+              <a:t>11/8/2017</a:t>
             </a:fld>
             <a:endParaRPr lang="en-US" dirty="0"/>
           </a:p>
@@ -3246,7 +3246,7 @@
           <a:p>
             <a:fld id="{E3BABB1C-FA00-4171-BA31-4C5E719472F3}" type="datetime1">
               <a:rPr lang="en-US" smtClean="0"/>
-              <a:t>10/9/2017</a:t>
+              <a:t>11/8/2017</a:t>
             </a:fld>
             <a:endParaRPr lang="en-US" dirty="0"/>
           </a:p>
@@ -3527,7 +3527,7 @@
           <a:p>
             <a:fld id="{D76C8610-5B57-4C6B-BF9F-F5397A1F60B8}" type="datetime1">
               <a:rPr lang="en-US" smtClean="0"/>
-              <a:t>10/9/2017</a:t>
+              <a:t>11/8/2017</a:t>
             </a:fld>
             <a:endParaRPr lang="en-US" dirty="0"/>
           </a:p>
@@ -3682,7 +3682,7 @@
           <a:p>
             <a:fld id="{BADBF3DD-8B6D-46AA-BCA9-242D4EF63DDF}" type="datetime1">
               <a:rPr lang="en-US" smtClean="0"/>
-              <a:t>10/9/2017</a:t>
+              <a:t>11/8/2017</a:t>
             </a:fld>
             <a:endParaRPr lang="en-US" dirty="0"/>
           </a:p>
@@ -4028,7 +4028,7 @@
           <a:p>
             <a:fld id="{23C41AE9-3D4A-4A08-B03D-DC6D2ADF5464}" type="datetime1">
               <a:rPr lang="en-US" smtClean="0"/>
-              <a:t>10/9/2017</a:t>
+              <a:t>11/8/2017</a:t>
             </a:fld>
             <a:endParaRPr lang="en-US" dirty="0"/>
           </a:p>
@@ -4701,7 +4701,7 @@
           <a:p>
             <a:fld id="{5C6E67D0-0200-42BE-A0B2-78C70FBBB312}" type="datetime1">
               <a:rPr lang="en-US" smtClean="0"/>
-              <a:t>10/9/2017</a:t>
+              <a:t>11/8/2017</a:t>
             </a:fld>
             <a:endParaRPr lang="en-US" dirty="0"/>
           </a:p>
@@ -5271,37 +5271,13 @@
           <a:p>
             <a:r>
               <a:rPr lang="en-US" dirty="0"/>
-              <a:t>Ali </a:t>
-            </a:r>
-            <a:r>
-              <a:rPr lang="en-US" dirty="0" err="1"/>
-              <a:t>Haisam</a:t>
-            </a:r>
+              <a:t>Ali Haisam Muhammad Rafid | 1405013</a:t>
+            </a:r>
+          </a:p>
+          <a:p>
             <a:r>
               <a:rPr lang="en-US" dirty="0"/>
-              <a:t> Muhammad </a:t>
-            </a:r>
-            <a:r>
-              <a:rPr lang="en-US" dirty="0" err="1"/>
-              <a:t>Rafid</a:t>
-            </a:r>
-            <a:r>
-              <a:rPr lang="en-US" dirty="0"/>
-              <a:t> | 1405013</a:t>
-            </a:r>
-          </a:p>
-          <a:p>
-            <a:r>
-              <a:rPr lang="en-US" dirty="0"/>
-              <a:t>Md. </a:t>
-            </a:r>
-            <a:r>
-              <a:rPr lang="en-US" dirty="0" err="1"/>
-              <a:t>Toufikuzzaman</a:t>
-            </a:r>
-            <a:r>
-              <a:rPr lang="en-US" dirty="0"/>
-              <a:t> | 1405015</a:t>
+              <a:t>Md. Toufikuzzaman | 1405015</a:t>
             </a:r>
           </a:p>
         </p:txBody>
@@ -5681,7 +5657,7 @@
           <p:cNvPr id="4" name="TextBox 3">
             <a:extLst>
               <a:ext uri="{FF2B5EF4-FFF2-40B4-BE49-F238E27FC236}">
-                <a16:creationId xmlns:a16="http://schemas.microsoft.com/office/drawing/2014/main" id="{D9CB5193-65B7-4735-B649-D8443660BEAC}"/>
+                <a16:creationId xmlns:a16="http://schemas.microsoft.com/office/drawing/2014/main" xmlns="" id="{D9CB5193-65B7-4735-B649-D8443660BEAC}"/>
               </a:ext>
             </a:extLst>
           </p:cNvPr>

</xml_diff>